<commit_message>
Commit 12 September 2024 - final update, report and ppt added
</commit_message>
<xml_diff>
--- a/FSR_PROJECT.pptx
+++ b/FSR_PROJECT.pptx
@@ -162,6 +162,425 @@
 </p188:authorLst>
 </file>
 
+<file path=ppt/changesInfos/changesInfo1.xml><?xml version="1.0" encoding="utf-8"?>
+<pc:chgInfo xmlns:a="http://schemas.openxmlformats.org/drawingml/2006/main" xmlns:r="http://schemas.openxmlformats.org/officeDocument/2006/relationships" xmlns:ac="http://schemas.microsoft.com/office/drawing/2013/main/command" xmlns:pc="http://schemas.microsoft.com/office/powerpoint/2013/main/command">
+  <pc:docChgLst>
+    <pc:chgData name="Paolo Maisto" userId="5631adec-571f-44b6-80d8-06a6dd3ca642" providerId="ADAL" clId="{99E021E2-D21C-4350-B725-1B105EA20074}"/>
+    <pc:docChg chg="modSld">
+      <pc:chgData name="Paolo Maisto" userId="5631adec-571f-44b6-80d8-06a6dd3ca642" providerId="ADAL" clId="{99E021E2-D21C-4350-B725-1B105EA20074}" dt="2024-09-12T18:01:54.961" v="81" actId="20577"/>
+      <pc:docMkLst>
+        <pc:docMk/>
+      </pc:docMkLst>
+      <pc:sldChg chg="modSp mod">
+        <pc:chgData name="Paolo Maisto" userId="5631adec-571f-44b6-80d8-06a6dd3ca642" providerId="ADAL" clId="{99E021E2-D21C-4350-B725-1B105EA20074}" dt="2024-09-12T17:59:41.137" v="3" actId="20577"/>
+        <pc:sldMkLst>
+          <pc:docMk/>
+          <pc:sldMk cId="1823010887" sldId="263"/>
+        </pc:sldMkLst>
+        <pc:spChg chg="mod">
+          <ac:chgData name="Paolo Maisto" userId="5631adec-571f-44b6-80d8-06a6dd3ca642" providerId="ADAL" clId="{99E021E2-D21C-4350-B725-1B105EA20074}" dt="2024-09-12T17:59:41.137" v="3" actId="20577"/>
+          <ac:spMkLst>
+            <pc:docMk/>
+            <pc:sldMk cId="1823010887" sldId="263"/>
+            <ac:spMk id="2" creationId="{00000000-0000-0000-0000-000000000000}"/>
+          </ac:spMkLst>
+        </pc:spChg>
+      </pc:sldChg>
+      <pc:sldChg chg="modSp mod">
+        <pc:chgData name="Paolo Maisto" userId="5631adec-571f-44b6-80d8-06a6dd3ca642" providerId="ADAL" clId="{99E021E2-D21C-4350-B725-1B105EA20074}" dt="2024-09-12T17:59:59.059" v="15" actId="20577"/>
+        <pc:sldMkLst>
+          <pc:docMk/>
+          <pc:sldMk cId="683529770" sldId="286"/>
+        </pc:sldMkLst>
+        <pc:spChg chg="mod">
+          <ac:chgData name="Paolo Maisto" userId="5631adec-571f-44b6-80d8-06a6dd3ca642" providerId="ADAL" clId="{99E021E2-D21C-4350-B725-1B105EA20074}" dt="2024-09-12T17:59:59.059" v="15" actId="20577"/>
+          <ac:spMkLst>
+            <pc:docMk/>
+            <pc:sldMk cId="683529770" sldId="286"/>
+            <ac:spMk id="2" creationId="{00000000-0000-0000-0000-000000000000}"/>
+          </ac:spMkLst>
+        </pc:spChg>
+      </pc:sldChg>
+      <pc:sldChg chg="modSp mod">
+        <pc:chgData name="Paolo Maisto" userId="5631adec-571f-44b6-80d8-06a6dd3ca642" providerId="ADAL" clId="{99E021E2-D21C-4350-B725-1B105EA20074}" dt="2024-09-12T17:59:49.393" v="7" actId="20577"/>
+        <pc:sldMkLst>
+          <pc:docMk/>
+          <pc:sldMk cId="2130360650" sldId="288"/>
+        </pc:sldMkLst>
+        <pc:spChg chg="mod">
+          <ac:chgData name="Paolo Maisto" userId="5631adec-571f-44b6-80d8-06a6dd3ca642" providerId="ADAL" clId="{99E021E2-D21C-4350-B725-1B105EA20074}" dt="2024-09-12T17:59:49.393" v="7" actId="20577"/>
+          <ac:spMkLst>
+            <pc:docMk/>
+            <pc:sldMk cId="2130360650" sldId="288"/>
+            <ac:spMk id="2" creationId="{00000000-0000-0000-0000-000000000000}"/>
+          </ac:spMkLst>
+        </pc:spChg>
+      </pc:sldChg>
+      <pc:sldChg chg="modSp mod">
+        <pc:chgData name="Paolo Maisto" userId="5631adec-571f-44b6-80d8-06a6dd3ca642" providerId="ADAL" clId="{99E021E2-D21C-4350-B725-1B105EA20074}" dt="2024-09-12T17:59:53.386" v="11" actId="20577"/>
+        <pc:sldMkLst>
+          <pc:docMk/>
+          <pc:sldMk cId="395012851" sldId="301"/>
+        </pc:sldMkLst>
+        <pc:spChg chg="mod">
+          <ac:chgData name="Paolo Maisto" userId="5631adec-571f-44b6-80d8-06a6dd3ca642" providerId="ADAL" clId="{99E021E2-D21C-4350-B725-1B105EA20074}" dt="2024-09-12T17:59:53.386" v="11" actId="20577"/>
+          <ac:spMkLst>
+            <pc:docMk/>
+            <pc:sldMk cId="395012851" sldId="301"/>
+            <ac:spMk id="2" creationId="{00000000-0000-0000-0000-000000000000}"/>
+          </ac:spMkLst>
+        </pc:spChg>
+      </pc:sldChg>
+      <pc:sldChg chg="modSp mod">
+        <pc:chgData name="Paolo Maisto" userId="5631adec-571f-44b6-80d8-06a6dd3ca642" providerId="ADAL" clId="{99E021E2-D21C-4350-B725-1B105EA20074}" dt="2024-09-12T18:01:16.418" v="59" actId="20577"/>
+        <pc:sldMkLst>
+          <pc:docMk/>
+          <pc:sldMk cId="920882815" sldId="335"/>
+        </pc:sldMkLst>
+        <pc:spChg chg="mod">
+          <ac:chgData name="Paolo Maisto" userId="5631adec-571f-44b6-80d8-06a6dd3ca642" providerId="ADAL" clId="{99E021E2-D21C-4350-B725-1B105EA20074}" dt="2024-09-12T18:01:16.418" v="59" actId="20577"/>
+          <ac:spMkLst>
+            <pc:docMk/>
+            <pc:sldMk cId="920882815" sldId="335"/>
+            <ac:spMk id="2" creationId="{00000000-0000-0000-0000-000000000000}"/>
+          </ac:spMkLst>
+        </pc:spChg>
+      </pc:sldChg>
+      <pc:sldChg chg="modSp mod">
+        <pc:chgData name="Paolo Maisto" userId="5631adec-571f-44b6-80d8-06a6dd3ca642" providerId="ADAL" clId="{99E021E2-D21C-4350-B725-1B105EA20074}" dt="2024-09-12T18:00:11.456" v="23" actId="20577"/>
+        <pc:sldMkLst>
+          <pc:docMk/>
+          <pc:sldMk cId="326445345" sldId="336"/>
+        </pc:sldMkLst>
+        <pc:spChg chg="mod">
+          <ac:chgData name="Paolo Maisto" userId="5631adec-571f-44b6-80d8-06a6dd3ca642" providerId="ADAL" clId="{99E021E2-D21C-4350-B725-1B105EA20074}" dt="2024-09-12T18:00:11.456" v="23" actId="20577"/>
+          <ac:spMkLst>
+            <pc:docMk/>
+            <pc:sldMk cId="326445345" sldId="336"/>
+            <ac:spMk id="2" creationId="{00000000-0000-0000-0000-000000000000}"/>
+          </ac:spMkLst>
+        </pc:spChg>
+      </pc:sldChg>
+      <pc:sldChg chg="modSp mod">
+        <pc:chgData name="Paolo Maisto" userId="5631adec-571f-44b6-80d8-06a6dd3ca642" providerId="ADAL" clId="{99E021E2-D21C-4350-B725-1B105EA20074}" dt="2024-09-12T18:00:40.353" v="45" actId="20577"/>
+        <pc:sldMkLst>
+          <pc:docMk/>
+          <pc:sldMk cId="230144261" sldId="340"/>
+        </pc:sldMkLst>
+        <pc:spChg chg="mod">
+          <ac:chgData name="Paolo Maisto" userId="5631adec-571f-44b6-80d8-06a6dd3ca642" providerId="ADAL" clId="{99E021E2-D21C-4350-B725-1B105EA20074}" dt="2024-09-12T18:00:40.353" v="45" actId="20577"/>
+          <ac:spMkLst>
+            <pc:docMk/>
+            <pc:sldMk cId="230144261" sldId="340"/>
+            <ac:spMk id="2" creationId="{00000000-0000-0000-0000-000000000000}"/>
+          </ac:spMkLst>
+        </pc:spChg>
+      </pc:sldChg>
+      <pc:sldChg chg="modSp mod">
+        <pc:chgData name="Paolo Maisto" userId="5631adec-571f-44b6-80d8-06a6dd3ca642" providerId="ADAL" clId="{99E021E2-D21C-4350-B725-1B105EA20074}" dt="2024-09-12T18:00:32.173" v="37" actId="20577"/>
+        <pc:sldMkLst>
+          <pc:docMk/>
+          <pc:sldMk cId="4141889126" sldId="341"/>
+        </pc:sldMkLst>
+        <pc:spChg chg="mod">
+          <ac:chgData name="Paolo Maisto" userId="5631adec-571f-44b6-80d8-06a6dd3ca642" providerId="ADAL" clId="{99E021E2-D21C-4350-B725-1B105EA20074}" dt="2024-09-12T18:00:32.173" v="37" actId="20577"/>
+          <ac:spMkLst>
+            <pc:docMk/>
+            <pc:sldMk cId="4141889126" sldId="341"/>
+            <ac:spMk id="2" creationId="{00000000-0000-0000-0000-000000000000}"/>
+          </ac:spMkLst>
+        </pc:spChg>
+      </pc:sldChg>
+      <pc:sldChg chg="modSp mod">
+        <pc:chgData name="Paolo Maisto" userId="5631adec-571f-44b6-80d8-06a6dd3ca642" providerId="ADAL" clId="{99E021E2-D21C-4350-B725-1B105EA20074}" dt="2024-09-12T18:00:43.995" v="49" actId="20577"/>
+        <pc:sldMkLst>
+          <pc:docMk/>
+          <pc:sldMk cId="225372058" sldId="342"/>
+        </pc:sldMkLst>
+        <pc:spChg chg="mod">
+          <ac:chgData name="Paolo Maisto" userId="5631adec-571f-44b6-80d8-06a6dd3ca642" providerId="ADAL" clId="{99E021E2-D21C-4350-B725-1B105EA20074}" dt="2024-09-12T18:00:43.995" v="49" actId="20577"/>
+          <ac:spMkLst>
+            <pc:docMk/>
+            <pc:sldMk cId="225372058" sldId="342"/>
+            <ac:spMk id="2" creationId="{00000000-0000-0000-0000-000000000000}"/>
+          </ac:spMkLst>
+        </pc:spChg>
+      </pc:sldChg>
+      <pc:sldChg chg="modSp mod">
+        <pc:chgData name="Paolo Maisto" userId="5631adec-571f-44b6-80d8-06a6dd3ca642" providerId="ADAL" clId="{99E021E2-D21C-4350-B725-1B105EA20074}" dt="2024-09-12T18:01:21.588" v="61" actId="20577"/>
+        <pc:sldMkLst>
+          <pc:docMk/>
+          <pc:sldMk cId="2113858536" sldId="343"/>
+        </pc:sldMkLst>
+        <pc:spChg chg="mod">
+          <ac:chgData name="Paolo Maisto" userId="5631adec-571f-44b6-80d8-06a6dd3ca642" providerId="ADAL" clId="{99E021E2-D21C-4350-B725-1B105EA20074}" dt="2024-09-12T18:01:21.588" v="61" actId="20577"/>
+          <ac:spMkLst>
+            <pc:docMk/>
+            <pc:sldMk cId="2113858536" sldId="343"/>
+            <ac:spMk id="2" creationId="{00000000-0000-0000-0000-000000000000}"/>
+          </ac:spMkLst>
+        </pc:spChg>
+      </pc:sldChg>
+      <pc:sldChg chg="modSp mod">
+        <pc:chgData name="Paolo Maisto" userId="5631adec-571f-44b6-80d8-06a6dd3ca642" providerId="ADAL" clId="{99E021E2-D21C-4350-B725-1B105EA20074}" dt="2024-09-12T18:01:28.668" v="65" actId="20577"/>
+        <pc:sldMkLst>
+          <pc:docMk/>
+          <pc:sldMk cId="2243674483" sldId="344"/>
+        </pc:sldMkLst>
+        <pc:spChg chg="mod">
+          <ac:chgData name="Paolo Maisto" userId="5631adec-571f-44b6-80d8-06a6dd3ca642" providerId="ADAL" clId="{99E021E2-D21C-4350-B725-1B105EA20074}" dt="2024-09-12T18:01:28.668" v="65" actId="20577"/>
+          <ac:spMkLst>
+            <pc:docMk/>
+            <pc:sldMk cId="2243674483" sldId="344"/>
+            <ac:spMk id="2" creationId="{00000000-0000-0000-0000-000000000000}"/>
+          </ac:spMkLst>
+        </pc:spChg>
+      </pc:sldChg>
+      <pc:sldChg chg="modSp mod">
+        <pc:chgData name="Paolo Maisto" userId="5631adec-571f-44b6-80d8-06a6dd3ca642" providerId="ADAL" clId="{99E021E2-D21C-4350-B725-1B105EA20074}" dt="2024-09-12T18:01:24.705" v="63" actId="20577"/>
+        <pc:sldMkLst>
+          <pc:docMk/>
+          <pc:sldMk cId="2294154019" sldId="346"/>
+        </pc:sldMkLst>
+        <pc:spChg chg="mod">
+          <ac:chgData name="Paolo Maisto" userId="5631adec-571f-44b6-80d8-06a6dd3ca642" providerId="ADAL" clId="{99E021E2-D21C-4350-B725-1B105EA20074}" dt="2024-09-12T18:01:24.705" v="63" actId="20577"/>
+          <ac:spMkLst>
+            <pc:docMk/>
+            <pc:sldMk cId="2294154019" sldId="346"/>
+            <ac:spMk id="2" creationId="{00000000-0000-0000-0000-000000000000}"/>
+          </ac:spMkLst>
+        </pc:spChg>
+      </pc:sldChg>
+      <pc:sldChg chg="modSp mod">
+        <pc:chgData name="Paolo Maisto" userId="5631adec-571f-44b6-80d8-06a6dd3ca642" providerId="ADAL" clId="{99E021E2-D21C-4350-B725-1B105EA20074}" dt="2024-09-12T18:00:06.019" v="19" actId="20577"/>
+        <pc:sldMkLst>
+          <pc:docMk/>
+          <pc:sldMk cId="2785475065" sldId="347"/>
+        </pc:sldMkLst>
+        <pc:spChg chg="mod">
+          <ac:chgData name="Paolo Maisto" userId="5631adec-571f-44b6-80d8-06a6dd3ca642" providerId="ADAL" clId="{99E021E2-D21C-4350-B725-1B105EA20074}" dt="2024-09-12T18:00:06.019" v="19" actId="20577"/>
+          <ac:spMkLst>
+            <pc:docMk/>
+            <pc:sldMk cId="2785475065" sldId="347"/>
+            <ac:spMk id="2" creationId="{00000000-0000-0000-0000-000000000000}"/>
+          </ac:spMkLst>
+        </pc:spChg>
+      </pc:sldChg>
+      <pc:sldChg chg="modSp mod">
+        <pc:chgData name="Paolo Maisto" userId="5631adec-571f-44b6-80d8-06a6dd3ca642" providerId="ADAL" clId="{99E021E2-D21C-4350-B725-1B105EA20074}" dt="2024-09-12T18:01:39.833" v="71" actId="20577"/>
+        <pc:sldMkLst>
+          <pc:docMk/>
+          <pc:sldMk cId="4126567776" sldId="348"/>
+        </pc:sldMkLst>
+        <pc:spChg chg="mod">
+          <ac:chgData name="Paolo Maisto" userId="5631adec-571f-44b6-80d8-06a6dd3ca642" providerId="ADAL" clId="{99E021E2-D21C-4350-B725-1B105EA20074}" dt="2024-09-12T18:01:39.833" v="71" actId="20577"/>
+          <ac:spMkLst>
+            <pc:docMk/>
+            <pc:sldMk cId="4126567776" sldId="348"/>
+            <ac:spMk id="2" creationId="{00000000-0000-0000-0000-000000000000}"/>
+          </ac:spMkLst>
+        </pc:spChg>
+      </pc:sldChg>
+      <pc:sldChg chg="modSp mod">
+        <pc:chgData name="Paolo Maisto" userId="5631adec-571f-44b6-80d8-06a6dd3ca642" providerId="ADAL" clId="{99E021E2-D21C-4350-B725-1B105EA20074}" dt="2024-09-12T18:01:43.788" v="73" actId="20577"/>
+        <pc:sldMkLst>
+          <pc:docMk/>
+          <pc:sldMk cId="3506931549" sldId="349"/>
+        </pc:sldMkLst>
+        <pc:spChg chg="mod">
+          <ac:chgData name="Paolo Maisto" userId="5631adec-571f-44b6-80d8-06a6dd3ca642" providerId="ADAL" clId="{99E021E2-D21C-4350-B725-1B105EA20074}" dt="2024-09-12T18:01:43.788" v="73" actId="20577"/>
+          <ac:spMkLst>
+            <pc:docMk/>
+            <pc:sldMk cId="3506931549" sldId="349"/>
+            <ac:spMk id="2" creationId="{00000000-0000-0000-0000-000000000000}"/>
+          </ac:spMkLst>
+        </pc:spChg>
+      </pc:sldChg>
+      <pc:sldChg chg="modSp mod">
+        <pc:chgData name="Paolo Maisto" userId="5631adec-571f-44b6-80d8-06a6dd3ca642" providerId="ADAL" clId="{99E021E2-D21C-4350-B725-1B105EA20074}" dt="2024-09-12T18:01:51.131" v="77" actId="20577"/>
+        <pc:sldMkLst>
+          <pc:docMk/>
+          <pc:sldMk cId="1616334452" sldId="351"/>
+        </pc:sldMkLst>
+        <pc:spChg chg="mod">
+          <ac:chgData name="Paolo Maisto" userId="5631adec-571f-44b6-80d8-06a6dd3ca642" providerId="ADAL" clId="{99E021E2-D21C-4350-B725-1B105EA20074}" dt="2024-09-12T18:01:51.131" v="77" actId="20577"/>
+          <ac:spMkLst>
+            <pc:docMk/>
+            <pc:sldMk cId="1616334452" sldId="351"/>
+            <ac:spMk id="2" creationId="{00000000-0000-0000-0000-000000000000}"/>
+          </ac:spMkLst>
+        </pc:spChg>
+      </pc:sldChg>
+      <pc:sldChg chg="modSp mod">
+        <pc:chgData name="Paolo Maisto" userId="5631adec-571f-44b6-80d8-06a6dd3ca642" providerId="ADAL" clId="{99E021E2-D21C-4350-B725-1B105EA20074}" dt="2024-09-12T18:00:26.995" v="33" actId="20577"/>
+        <pc:sldMkLst>
+          <pc:docMk/>
+          <pc:sldMk cId="3845044769" sldId="353"/>
+        </pc:sldMkLst>
+        <pc:spChg chg="mod">
+          <ac:chgData name="Paolo Maisto" userId="5631adec-571f-44b6-80d8-06a6dd3ca642" providerId="ADAL" clId="{99E021E2-D21C-4350-B725-1B105EA20074}" dt="2024-09-12T18:00:26.995" v="33" actId="20577"/>
+          <ac:spMkLst>
+            <pc:docMk/>
+            <pc:sldMk cId="3845044769" sldId="353"/>
+            <ac:spMk id="2" creationId="{00000000-0000-0000-0000-000000000000}"/>
+          </ac:spMkLst>
+        </pc:spChg>
+      </pc:sldChg>
+      <pc:sldChg chg="modSp mod">
+        <pc:chgData name="Paolo Maisto" userId="5631adec-571f-44b6-80d8-06a6dd3ca642" providerId="ADAL" clId="{99E021E2-D21C-4350-B725-1B105EA20074}" dt="2024-09-12T18:01:32.018" v="67" actId="20577"/>
+        <pc:sldMkLst>
+          <pc:docMk/>
+          <pc:sldMk cId="4206277648" sldId="355"/>
+        </pc:sldMkLst>
+        <pc:spChg chg="mod">
+          <ac:chgData name="Paolo Maisto" userId="5631adec-571f-44b6-80d8-06a6dd3ca642" providerId="ADAL" clId="{99E021E2-D21C-4350-B725-1B105EA20074}" dt="2024-09-12T18:01:32.018" v="67" actId="20577"/>
+          <ac:spMkLst>
+            <pc:docMk/>
+            <pc:sldMk cId="4206277648" sldId="355"/>
+            <ac:spMk id="2" creationId="{00000000-0000-0000-0000-000000000000}"/>
+          </ac:spMkLst>
+        </pc:spChg>
+      </pc:sldChg>
+      <pc:sldChg chg="modSp mod">
+        <pc:chgData name="Paolo Maisto" userId="5631adec-571f-44b6-80d8-06a6dd3ca642" providerId="ADAL" clId="{99E021E2-D21C-4350-B725-1B105EA20074}" dt="2024-09-12T18:01:35.352" v="69" actId="20577"/>
+        <pc:sldMkLst>
+          <pc:docMk/>
+          <pc:sldMk cId="2896735955" sldId="357"/>
+        </pc:sldMkLst>
+        <pc:spChg chg="mod">
+          <ac:chgData name="Paolo Maisto" userId="5631adec-571f-44b6-80d8-06a6dd3ca642" providerId="ADAL" clId="{99E021E2-D21C-4350-B725-1B105EA20074}" dt="2024-09-12T18:01:35.352" v="69" actId="20577"/>
+          <ac:spMkLst>
+            <pc:docMk/>
+            <pc:sldMk cId="2896735955" sldId="357"/>
+            <ac:spMk id="2" creationId="{00000000-0000-0000-0000-000000000000}"/>
+          </ac:spMkLst>
+        </pc:spChg>
+      </pc:sldChg>
+      <pc:sldChg chg="modSp mod">
+        <pc:chgData name="Paolo Maisto" userId="5631adec-571f-44b6-80d8-06a6dd3ca642" providerId="ADAL" clId="{99E021E2-D21C-4350-B725-1B105EA20074}" dt="2024-09-12T18:01:47.296" v="75" actId="20577"/>
+        <pc:sldMkLst>
+          <pc:docMk/>
+          <pc:sldMk cId="2356377047" sldId="358"/>
+        </pc:sldMkLst>
+        <pc:spChg chg="mod">
+          <ac:chgData name="Paolo Maisto" userId="5631adec-571f-44b6-80d8-06a6dd3ca642" providerId="ADAL" clId="{99E021E2-D21C-4350-B725-1B105EA20074}" dt="2024-09-12T18:01:47.296" v="75" actId="20577"/>
+          <ac:spMkLst>
+            <pc:docMk/>
+            <pc:sldMk cId="2356377047" sldId="358"/>
+            <ac:spMk id="2" creationId="{00000000-0000-0000-0000-000000000000}"/>
+          </ac:spMkLst>
+        </pc:spChg>
+      </pc:sldChg>
+      <pc:sldChg chg="modSp mod">
+        <pc:chgData name="Paolo Maisto" userId="5631adec-571f-44b6-80d8-06a6dd3ca642" providerId="ADAL" clId="{99E021E2-D21C-4350-B725-1B105EA20074}" dt="2024-09-12T18:00:23.660" v="29" actId="20577"/>
+        <pc:sldMkLst>
+          <pc:docMk/>
+          <pc:sldMk cId="3076494034" sldId="359"/>
+        </pc:sldMkLst>
+        <pc:spChg chg="mod">
+          <ac:chgData name="Paolo Maisto" userId="5631adec-571f-44b6-80d8-06a6dd3ca642" providerId="ADAL" clId="{99E021E2-D21C-4350-B725-1B105EA20074}" dt="2024-09-12T18:00:23.660" v="29" actId="20577"/>
+          <ac:spMkLst>
+            <pc:docMk/>
+            <pc:sldMk cId="3076494034" sldId="359"/>
+            <ac:spMk id="2" creationId="{00000000-0000-0000-0000-000000000000}"/>
+          </ac:spMkLst>
+        </pc:spChg>
+      </pc:sldChg>
+      <pc:sldChg chg="modSp mod">
+        <pc:chgData name="Paolo Maisto" userId="5631adec-571f-44b6-80d8-06a6dd3ca642" providerId="ADAL" clId="{99E021E2-D21C-4350-B725-1B105EA20074}" dt="2024-09-12T18:00:15.763" v="25" actId="20577"/>
+        <pc:sldMkLst>
+          <pc:docMk/>
+          <pc:sldMk cId="2947281596" sldId="360"/>
+        </pc:sldMkLst>
+        <pc:spChg chg="mod">
+          <ac:chgData name="Paolo Maisto" userId="5631adec-571f-44b6-80d8-06a6dd3ca642" providerId="ADAL" clId="{99E021E2-D21C-4350-B725-1B105EA20074}" dt="2024-09-12T18:00:15.763" v="25" actId="20577"/>
+          <ac:spMkLst>
+            <pc:docMk/>
+            <pc:sldMk cId="2947281596" sldId="360"/>
+            <ac:spMk id="2" creationId="{00000000-0000-0000-0000-000000000000}"/>
+          </ac:spMkLst>
+        </pc:spChg>
+      </pc:sldChg>
+      <pc:sldChg chg="modSp mod">
+        <pc:chgData name="Paolo Maisto" userId="5631adec-571f-44b6-80d8-06a6dd3ca642" providerId="ADAL" clId="{99E021E2-D21C-4350-B725-1B105EA20074}" dt="2024-09-12T18:00:36.099" v="41" actId="20577"/>
+        <pc:sldMkLst>
+          <pc:docMk/>
+          <pc:sldMk cId="1830369155" sldId="362"/>
+        </pc:sldMkLst>
+        <pc:spChg chg="mod">
+          <ac:chgData name="Paolo Maisto" userId="5631adec-571f-44b6-80d8-06a6dd3ca642" providerId="ADAL" clId="{99E021E2-D21C-4350-B725-1B105EA20074}" dt="2024-09-12T18:00:36.099" v="41" actId="20577"/>
+          <ac:spMkLst>
+            <pc:docMk/>
+            <pc:sldMk cId="1830369155" sldId="362"/>
+            <ac:spMk id="2" creationId="{00000000-0000-0000-0000-000000000000}"/>
+          </ac:spMkLst>
+        </pc:spChg>
+      </pc:sldChg>
+      <pc:sldChg chg="modSp mod">
+        <pc:chgData name="Paolo Maisto" userId="5631adec-571f-44b6-80d8-06a6dd3ca642" providerId="ADAL" clId="{99E021E2-D21C-4350-B725-1B105EA20074}" dt="2024-09-12T18:00:47.418" v="51" actId="20577"/>
+        <pc:sldMkLst>
+          <pc:docMk/>
+          <pc:sldMk cId="3773320804" sldId="363"/>
+        </pc:sldMkLst>
+        <pc:spChg chg="mod">
+          <ac:chgData name="Paolo Maisto" userId="5631adec-571f-44b6-80d8-06a6dd3ca642" providerId="ADAL" clId="{99E021E2-D21C-4350-B725-1B105EA20074}" dt="2024-09-12T18:00:47.418" v="51" actId="20577"/>
+          <ac:spMkLst>
+            <pc:docMk/>
+            <pc:sldMk cId="3773320804" sldId="363"/>
+            <ac:spMk id="2" creationId="{00000000-0000-0000-0000-000000000000}"/>
+          </ac:spMkLst>
+        </pc:spChg>
+      </pc:sldChg>
+      <pc:sldChg chg="modSp mod">
+        <pc:chgData name="Paolo Maisto" userId="5631adec-571f-44b6-80d8-06a6dd3ca642" providerId="ADAL" clId="{99E021E2-D21C-4350-B725-1B105EA20074}" dt="2024-09-12T18:01:12.399" v="57" actId="20577"/>
+        <pc:sldMkLst>
+          <pc:docMk/>
+          <pc:sldMk cId="4248951617" sldId="364"/>
+        </pc:sldMkLst>
+        <pc:spChg chg="mod">
+          <ac:chgData name="Paolo Maisto" userId="5631adec-571f-44b6-80d8-06a6dd3ca642" providerId="ADAL" clId="{99E021E2-D21C-4350-B725-1B105EA20074}" dt="2024-09-12T18:01:12.399" v="57" actId="20577"/>
+          <ac:spMkLst>
+            <pc:docMk/>
+            <pc:sldMk cId="4248951617" sldId="364"/>
+            <ac:spMk id="2" creationId="{00000000-0000-0000-0000-000000000000}"/>
+          </ac:spMkLst>
+        </pc:spChg>
+      </pc:sldChg>
+      <pc:sldChg chg="modSp mod">
+        <pc:chgData name="Paolo Maisto" userId="5631adec-571f-44b6-80d8-06a6dd3ca642" providerId="ADAL" clId="{99E021E2-D21C-4350-B725-1B105EA20074}" dt="2024-09-12T18:00:51.501" v="55" actId="20577"/>
+        <pc:sldMkLst>
+          <pc:docMk/>
+          <pc:sldMk cId="3635911069" sldId="365"/>
+        </pc:sldMkLst>
+        <pc:spChg chg="mod">
+          <ac:chgData name="Paolo Maisto" userId="5631adec-571f-44b6-80d8-06a6dd3ca642" providerId="ADAL" clId="{99E021E2-D21C-4350-B725-1B105EA20074}" dt="2024-09-12T18:00:51.501" v="55" actId="20577"/>
+          <ac:spMkLst>
+            <pc:docMk/>
+            <pc:sldMk cId="3635911069" sldId="365"/>
+            <ac:spMk id="2" creationId="{00000000-0000-0000-0000-000000000000}"/>
+          </ac:spMkLst>
+        </pc:spChg>
+      </pc:sldChg>
+      <pc:sldChg chg="modSp mod">
+        <pc:chgData name="Paolo Maisto" userId="5631adec-571f-44b6-80d8-06a6dd3ca642" providerId="ADAL" clId="{99E021E2-D21C-4350-B725-1B105EA20074}" dt="2024-09-12T18:01:54.961" v="81" actId="20577"/>
+        <pc:sldMkLst>
+          <pc:docMk/>
+          <pc:sldMk cId="812855226" sldId="366"/>
+        </pc:sldMkLst>
+        <pc:spChg chg="mod">
+          <ac:chgData name="Paolo Maisto" userId="5631adec-571f-44b6-80d8-06a6dd3ca642" providerId="ADAL" clId="{99E021E2-D21C-4350-B725-1B105EA20074}" dt="2024-09-12T18:01:54.961" v="81" actId="20577"/>
+          <ac:spMkLst>
+            <pc:docMk/>
+            <pc:sldMk cId="812855226" sldId="366"/>
+            <ac:spMk id="2" creationId="{00000000-0000-0000-0000-000000000000}"/>
+          </ac:spMkLst>
+        </pc:spChg>
+      </pc:sldChg>
+    </pc:docChg>
+  </pc:docChgLst>
+</pc:chgInfo>
+</file>
+
 <file path=ppt/handoutMasters/handoutMaster1.xml><?xml version="1.0" encoding="utf-8"?>
 <p:handoutMaster xmlns:a="http://schemas.openxmlformats.org/drawingml/2006/main" xmlns:r="http://schemas.openxmlformats.org/officeDocument/2006/relationships" xmlns:p="http://schemas.openxmlformats.org/presentationml/2006/main">
   <p:cSld>
@@ -244,7 +663,7 @@
           <a:p>
             <a:fld id="{0914F915-DDDE-4CAA-895D-614564BB8837}" type="datetimeFigureOut">
               <a:rPr lang="en-GB" smtClean="0"/>
-              <a:t>06/09/2024</a:t>
+              <a:t>12/09/2024</a:t>
             </a:fld>
             <a:endParaRPr lang="en-GB"/>
           </a:p>
@@ -409,7 +828,7 @@
           <a:p>
             <a:fld id="{A9D4C5A5-33D0-4441-96FE-163C8B7C9D3F}" type="datetimeFigureOut">
               <a:rPr lang="en-GB" smtClean="0"/>
-              <a:t>06/09/2024</a:t>
+              <a:t>12/09/2024</a:t>
             </a:fld>
             <a:endParaRPr lang="en-GB"/>
           </a:p>
@@ -6286,6 +6705,187 @@
           <a:bodyPr/>
           <a:lstStyle/>
           <a:p>
+            <a:pPr algn="l"/>
+            <a:r>
+              <a:rPr lang="en-US" sz="1200" b="0" i="0" u="none" strike="noStrike" baseline="0" dirty="0">
+                <a:latin typeface="CMR12"/>
+              </a:rPr>
+              <a:t>Then at the end the path that is obtained is given by the nodes that are expressed as cells of this matrix whose coordinates are constituted</a:t>
+            </a:r>
+          </a:p>
+          <a:p>
+            <a:pPr algn="l"/>
+            <a:r>
+              <a:rPr lang="en-US" sz="1200" b="0" i="0" u="none" strike="noStrike" baseline="0" dirty="0">
+                <a:latin typeface="CMR12"/>
+              </a:rPr>
+              <a:t>by the row and the column. Consequently giving these coordinates in </a:t>
+            </a:r>
+            <a:r>
+              <a:rPr lang="en-US" sz="1200" b="0" i="0" u="none" strike="noStrike" baseline="0" dirty="0" err="1">
+                <a:latin typeface="CMR12"/>
+              </a:rPr>
+              <a:t>simulink</a:t>
+            </a:r>
+            <a:r>
+              <a:rPr lang="en-US" sz="1200" b="0" i="0" u="none" strike="noStrike" baseline="0" dirty="0">
+                <a:latin typeface="CMR12"/>
+              </a:rPr>
+              <a:t> the path is obtained with y inverse, then to obtain the reference trajectory the y coordinate has been scaled, by applying the following formula:</a:t>
+            </a:r>
+          </a:p>
+          <a:p>
+            <a:pPr algn="l"/>
+            <a:r>
+              <a:rPr lang="en-US" sz="1200" b="0" i="0" u="none" strike="noStrike" baseline="0" dirty="0" err="1">
+                <a:latin typeface="CMMI12"/>
+              </a:rPr>
+              <a:t>y</a:t>
+            </a:r>
+            <a:r>
+              <a:rPr lang="en-US" sz="800" b="0" i="0" u="none" strike="noStrike" baseline="0" dirty="0" err="1">
+                <a:latin typeface="CMMI8"/>
+              </a:rPr>
+              <a:t>ref</a:t>
+            </a:r>
+            <a:r>
+              <a:rPr lang="en-US" sz="800" b="0" i="0" u="none" strike="noStrike" baseline="0" dirty="0">
+                <a:latin typeface="CMMI8"/>
+              </a:rPr>
+              <a:t> </a:t>
+            </a:r>
+            <a:r>
+              <a:rPr lang="en-US" sz="1200" b="0" i="0" u="none" strike="noStrike" baseline="0" dirty="0">
+                <a:latin typeface="CMR12"/>
+              </a:rPr>
+              <a:t>= </a:t>
+            </a:r>
+            <a:r>
+              <a:rPr lang="en-US" sz="1200" b="0" i="0" u="none" strike="noStrike" baseline="0" dirty="0">
+                <a:latin typeface="CMMI12"/>
+              </a:rPr>
+              <a:t>size</a:t>
+            </a:r>
+            <a:r>
+              <a:rPr lang="en-US" sz="1200" b="0" i="0" u="none" strike="noStrike" baseline="0" dirty="0">
+                <a:latin typeface="CMR12"/>
+              </a:rPr>
+              <a:t>(</a:t>
+            </a:r>
+            <a:r>
+              <a:rPr lang="en-US" sz="1200" b="0" i="0" u="none" strike="noStrike" baseline="0" dirty="0">
+                <a:latin typeface="CMMI12"/>
+              </a:rPr>
+              <a:t>map, </a:t>
+            </a:r>
+            <a:r>
+              <a:rPr lang="en-US" sz="1200" b="0" i="0" u="none" strike="noStrike" baseline="0" dirty="0">
+                <a:latin typeface="CMR12"/>
+              </a:rPr>
+              <a:t>1) </a:t>
+            </a:r>
+            <a:r>
+              <a:rPr lang="en-US" sz="1200" b="0" i="0" u="none" strike="noStrike" baseline="0" dirty="0">
+                <a:latin typeface="CMSY10"/>
+              </a:rPr>
+              <a:t>− </a:t>
+            </a:r>
+            <a:r>
+              <a:rPr lang="en-US" sz="1200" b="0" i="0" u="none" strike="noStrike" baseline="0" dirty="0">
+                <a:latin typeface="CMMI12"/>
+              </a:rPr>
+              <a:t>y</a:t>
+            </a:r>
+          </a:p>
+          <a:p>
+            <a:pPr algn="l"/>
+            <a:r>
+              <a:rPr lang="en-US" sz="1200" b="0" i="0" u="none" strike="noStrike" baseline="0" dirty="0">
+                <a:latin typeface="CMR12"/>
+              </a:rPr>
+              <a:t>in which </a:t>
+            </a:r>
+            <a:r>
+              <a:rPr lang="en-US" sz="1200" b="0" i="0" u="none" strike="noStrike" baseline="0" dirty="0">
+                <a:latin typeface="CMMI12"/>
+              </a:rPr>
+              <a:t>size</a:t>
+            </a:r>
+            <a:r>
+              <a:rPr lang="en-US" sz="1200" b="0" i="0" u="none" strike="noStrike" baseline="0" dirty="0">
+                <a:latin typeface="CMR12"/>
+              </a:rPr>
+              <a:t>(</a:t>
+            </a:r>
+            <a:r>
+              <a:rPr lang="en-US" sz="1200" b="0" i="0" u="none" strike="noStrike" baseline="0" dirty="0">
+                <a:latin typeface="CMMI12"/>
+              </a:rPr>
+              <a:t>map, </a:t>
+            </a:r>
+            <a:r>
+              <a:rPr lang="en-US" sz="1200" b="0" i="0" u="none" strike="noStrike" baseline="0" dirty="0">
+                <a:latin typeface="CMR12"/>
+              </a:rPr>
+              <a:t>1) expresses the number of rows of the map, while the </a:t>
+            </a:r>
+            <a:r>
+              <a:rPr lang="en-US" sz="1200" b="0" i="0" u="none" strike="noStrike" baseline="0" dirty="0">
+                <a:latin typeface="CMMI12"/>
+              </a:rPr>
+              <a:t>y </a:t>
+            </a:r>
+            <a:r>
+              <a:rPr lang="en-US" sz="1200" b="0" i="0" u="none" strike="noStrike" baseline="0" dirty="0">
+                <a:latin typeface="CMR12"/>
+              </a:rPr>
+              <a:t>the row where </a:t>
+            </a:r>
+            <a:r>
+              <a:rPr lang="it-IT" sz="1200" b="0" i="0" u="none" strike="noStrike" baseline="0" dirty="0">
+                <a:latin typeface="CMR12"/>
+              </a:rPr>
+              <a:t>the </a:t>
+            </a:r>
+            <a:r>
+              <a:rPr lang="it-IT" sz="1200" b="0" i="0" u="none" strike="noStrike" baseline="0" dirty="0" err="1">
+                <a:latin typeface="CMR12"/>
+              </a:rPr>
+              <a:t>node</a:t>
+            </a:r>
+            <a:r>
+              <a:rPr lang="it-IT" sz="1200" b="0" i="0" u="none" strike="noStrike" baseline="0" dirty="0">
+                <a:latin typeface="CMR12"/>
+              </a:rPr>
+              <a:t> </a:t>
+            </a:r>
+            <a:r>
+              <a:rPr lang="it-IT" sz="1200" b="0" i="0" u="none" strike="noStrike" baseline="0" dirty="0" err="1">
+                <a:latin typeface="CMR12"/>
+              </a:rPr>
+              <a:t>is</a:t>
+            </a:r>
+            <a:r>
+              <a:rPr lang="it-IT" sz="1200" b="0" i="0" u="none" strike="noStrike" baseline="0" dirty="0">
+                <a:latin typeface="CMR12"/>
+              </a:rPr>
+              <a:t> </a:t>
+            </a:r>
+            <a:r>
+              <a:rPr lang="it-IT" sz="1200" b="0" i="0" u="none" strike="noStrike" baseline="0" dirty="0" err="1">
+                <a:latin typeface="CMR12"/>
+              </a:rPr>
+              <a:t>located</a:t>
+            </a:r>
+            <a:r>
+              <a:rPr lang="it-IT" sz="1200" b="0" i="0" u="none" strike="noStrike" baseline="0" dirty="0">
+                <a:latin typeface="CMR12"/>
+              </a:rPr>
+              <a:t>.</a:t>
+            </a:r>
+            <a:endParaRPr lang="it-IT" dirty="0"/>
+          </a:p>
+          <a:p>
             <a:endParaRPr lang="en-GB" dirty="0"/>
           </a:p>
         </p:txBody>
@@ -7016,7 +7616,7 @@
           <a:p>
             <a:fld id="{2C790A91-0F3D-9944-94EF-F5C93CDE0643}" type="datetimeFigureOut">
               <a:rPr lang="it-IT" smtClean="0"/>
-              <a:t>06/09/2024</a:t>
+              <a:t>12/09/2024</a:t>
             </a:fld>
             <a:endParaRPr lang="it-IT"/>
           </a:p>
@@ -7196,7 +7796,7 @@
           <a:p>
             <a:fld id="{2C790A91-0F3D-9944-94EF-F5C93CDE0643}" type="datetimeFigureOut">
               <a:rPr lang="it-IT" smtClean="0"/>
-              <a:t>06/09/2024</a:t>
+              <a:t>12/09/2024</a:t>
             </a:fld>
             <a:endParaRPr lang="it-IT"/>
           </a:p>
@@ -7386,7 +7986,7 @@
           <a:p>
             <a:fld id="{2C790A91-0F3D-9944-94EF-F5C93CDE0643}" type="datetimeFigureOut">
               <a:rPr lang="it-IT" smtClean="0"/>
-              <a:t>06/09/2024</a:t>
+              <a:t>12/09/2024</a:t>
             </a:fld>
             <a:endParaRPr lang="it-IT"/>
           </a:p>
@@ -7566,7 +8166,7 @@
           <a:p>
             <a:fld id="{2C790A91-0F3D-9944-94EF-F5C93CDE0643}" type="datetimeFigureOut">
               <a:rPr lang="it-IT" smtClean="0"/>
-              <a:t>06/09/2024</a:t>
+              <a:t>12/09/2024</a:t>
             </a:fld>
             <a:endParaRPr lang="it-IT"/>
           </a:p>
@@ -7823,7 +8423,7 @@
           <a:p>
             <a:fld id="{2C790A91-0F3D-9944-94EF-F5C93CDE0643}" type="datetimeFigureOut">
               <a:rPr lang="it-IT" smtClean="0"/>
-              <a:t>06/09/2024</a:t>
+              <a:t>12/09/2024</a:t>
             </a:fld>
             <a:endParaRPr lang="it-IT"/>
           </a:p>
@@ -8120,7 +8720,7 @@
           <a:p>
             <a:fld id="{2C790A91-0F3D-9944-94EF-F5C93CDE0643}" type="datetimeFigureOut">
               <a:rPr lang="it-IT" smtClean="0"/>
-              <a:t>06/09/2024</a:t>
+              <a:t>12/09/2024</a:t>
             </a:fld>
             <a:endParaRPr lang="it-IT"/>
           </a:p>
@@ -8551,7 +9151,7 @@
           <a:p>
             <a:fld id="{2C790A91-0F3D-9944-94EF-F5C93CDE0643}" type="datetimeFigureOut">
               <a:rPr lang="it-IT" smtClean="0"/>
-              <a:t>06/09/2024</a:t>
+              <a:t>12/09/2024</a:t>
             </a:fld>
             <a:endParaRPr lang="it-IT"/>
           </a:p>
@@ -8680,7 +9280,7 @@
           <a:p>
             <a:fld id="{2C790A91-0F3D-9944-94EF-F5C93CDE0643}" type="datetimeFigureOut">
               <a:rPr lang="it-IT" smtClean="0"/>
-              <a:t>06/09/2024</a:t>
+              <a:t>12/09/2024</a:t>
             </a:fld>
             <a:endParaRPr lang="it-IT"/>
           </a:p>
@@ -8787,7 +9387,7 @@
           <a:p>
             <a:fld id="{2C790A91-0F3D-9944-94EF-F5C93CDE0643}" type="datetimeFigureOut">
               <a:rPr lang="it-IT" smtClean="0"/>
-              <a:t>06/09/2024</a:t>
+              <a:t>12/09/2024</a:t>
             </a:fld>
             <a:endParaRPr lang="it-IT"/>
           </a:p>
@@ -9074,7 +9674,7 @@
           <a:p>
             <a:fld id="{2C790A91-0F3D-9944-94EF-F5C93CDE0643}" type="datetimeFigureOut">
               <a:rPr lang="it-IT" smtClean="0"/>
-              <a:t>06/09/2024</a:t>
+              <a:t>12/09/2024</a:t>
             </a:fld>
             <a:endParaRPr lang="it-IT"/>
           </a:p>
@@ -9338,7 +9938,7 @@
           <a:p>
             <a:fld id="{2C790A91-0F3D-9944-94EF-F5C93CDE0643}" type="datetimeFigureOut">
               <a:rPr lang="it-IT" smtClean="0"/>
-              <a:t>06/09/2024</a:t>
+              <a:t>12/09/2024</a:t>
             </a:fld>
             <a:endParaRPr lang="it-IT"/>
           </a:p>
@@ -9561,7 +10161,7 @@
           <a:p>
             <a:fld id="{2C790A91-0F3D-9944-94EF-F5C93CDE0643}" type="datetimeFigureOut">
               <a:rPr lang="it-IT" smtClean="0"/>
-              <a:t>06/09/2024</a:t>
+              <a:t>12/09/2024</a:t>
             </a:fld>
             <a:endParaRPr lang="it-IT"/>
           </a:p>
@@ -10628,7 +11228,7 @@
                 <a:latin typeface="Century Gothic"/>
                 <a:cs typeface="Century Gothic"/>
               </a:rPr>
-              <a:t>/32</a:t>
+              <a:t>/28</a:t>
             </a:r>
           </a:p>
         </p:txBody>
@@ -11146,7 +11746,7 @@
                 <a:latin typeface="Century Gothic"/>
                 <a:cs typeface="Century Gothic"/>
               </a:rPr>
-              <a:t>/32</a:t>
+              <a:t>/28</a:t>
             </a:r>
           </a:p>
         </p:txBody>
@@ -11981,7 +12581,7 @@
                 <a:latin typeface="Century Gothic"/>
                 <a:cs typeface="Century Gothic"/>
               </a:rPr>
-              <a:t>/32</a:t>
+              <a:t>/28</a:t>
             </a:r>
           </a:p>
         </p:txBody>
@@ -12782,7 +13382,7 @@
                 <a:latin typeface="Century Gothic"/>
                 <a:cs typeface="Century Gothic"/>
               </a:rPr>
-              <a:t>/32</a:t>
+              <a:t>/28</a:t>
             </a:r>
           </a:p>
         </p:txBody>
@@ -13646,7 +14246,7 @@
                 <a:latin typeface="Century Gothic"/>
                 <a:cs typeface="Century Gothic"/>
               </a:rPr>
-              <a:t>/32</a:t>
+              <a:t>/28</a:t>
             </a:r>
           </a:p>
         </p:txBody>
@@ -14221,7 +14821,7 @@
                 <a:latin typeface="Century Gothic"/>
                 <a:cs typeface="Century Gothic"/>
               </a:rPr>
-              <a:t>/32</a:t>
+              <a:t>/28</a:t>
             </a:r>
           </a:p>
         </p:txBody>
@@ -16257,7 +16857,7 @@
                 <a:latin typeface="Century Gothic"/>
                 <a:cs typeface="Century Gothic"/>
               </a:rPr>
-              <a:t>/32</a:t>
+              <a:t>/28</a:t>
             </a:r>
           </a:p>
         </p:txBody>
@@ -16426,7 +17026,7 @@
         </p:nvSpPr>
         <p:spPr>
           <a:xfrm>
-            <a:off x="1110673" y="1963619"/>
+            <a:off x="1095683" y="1963619"/>
             <a:ext cx="2474844" cy="884583"/>
           </a:xfrm>
           <a:prstGeom prst="rect">
@@ -16493,7 +17093,7 @@
         </p:nvSpPr>
         <p:spPr>
           <a:xfrm>
-            <a:off x="559909" y="2133309"/>
+            <a:off x="544919" y="2133309"/>
             <a:ext cx="453002" cy="427601"/>
           </a:xfrm>
           <a:prstGeom prst="ellipse">
@@ -16558,7 +17158,7 @@
         </p:nvSpPr>
         <p:spPr>
           <a:xfrm>
-            <a:off x="6412675" y="4309055"/>
+            <a:off x="6367705" y="4309055"/>
             <a:ext cx="2474844" cy="884583"/>
           </a:xfrm>
           <a:prstGeom prst="rect">
@@ -16643,7 +17243,7 @@
         </p:nvSpPr>
         <p:spPr>
           <a:xfrm>
-            <a:off x="5861911" y="4478745"/>
+            <a:off x="5816941" y="4478745"/>
             <a:ext cx="453002" cy="427601"/>
           </a:xfrm>
           <a:prstGeom prst="ellipse">
@@ -16708,7 +17308,7 @@
         </p:nvSpPr>
         <p:spPr>
           <a:xfrm>
-            <a:off x="3711330" y="3121491"/>
+            <a:off x="3696340" y="3121491"/>
             <a:ext cx="2474844" cy="884583"/>
           </a:xfrm>
           <a:prstGeom prst="rect">
@@ -16772,7 +17372,7 @@
         </p:nvSpPr>
         <p:spPr>
           <a:xfrm>
-            <a:off x="3160566" y="3291181"/>
+            <a:off x="3145576" y="3291181"/>
             <a:ext cx="453002" cy="427601"/>
           </a:xfrm>
           <a:prstGeom prst="ellipse">
@@ -16837,7 +17437,7 @@
         </p:nvSpPr>
         <p:spPr>
           <a:xfrm>
-            <a:off x="9035409" y="5342833"/>
+            <a:off x="9020419" y="5342833"/>
             <a:ext cx="2474844" cy="884583"/>
           </a:xfrm>
           <a:prstGeom prst="rect">
@@ -16904,7 +17504,7 @@
         </p:nvSpPr>
         <p:spPr>
           <a:xfrm>
-            <a:off x="8484645" y="5512523"/>
+            <a:off x="8469655" y="5512523"/>
             <a:ext cx="453002" cy="427601"/>
           </a:xfrm>
           <a:prstGeom prst="ellipse">
@@ -17121,7 +17721,7 @@
                 <a:latin typeface="Century Gothic"/>
                 <a:cs typeface="Century Gothic"/>
               </a:rPr>
-              <a:t>/32</a:t>
+              <a:t>/28</a:t>
             </a:r>
           </a:p>
         </p:txBody>
@@ -17224,8 +17824,8 @@
           </a:prstGeom>
         </p:spPr>
       </p:pic>
-      <mc:AlternateContent xmlns:mc="http://schemas.openxmlformats.org/markup-compatibility/2006">
-        <mc:Choice xmlns:a14="http://schemas.microsoft.com/office/drawing/2010/main" Requires="a14">
+      <mc:AlternateContent xmlns:mc="http://schemas.openxmlformats.org/markup-compatibility/2006" xmlns:a14="http://schemas.microsoft.com/office/drawing/2010/main">
+        <mc:Choice Requires="a14">
           <p:sp>
             <p:nvSpPr>
               <p:cNvPr id="15" name="CasellaDiTesto 14">
@@ -18541,7 +19141,13 @@
                                         <a:rPr lang="it-IT" sz="1500" b="0" i="1" smtClean="0">
                                           <a:latin typeface="Cambria Math" panose="02040503050406030204" pitchFamily="18" charset="0"/>
                                         </a:rPr>
-                                        <m:t>)(</m:t>
+                                        <m:t>)</m:t>
+                                      </m:r>
+                                      <m:r>
+                                        <a:rPr lang="it-IT" sz="1500" b="0" i="1" smtClean="0">
+                                          <a:latin typeface="Cambria Math" panose="02040503050406030204" pitchFamily="18" charset="0"/>
+                                        </a:rPr>
+                                        <m:t>(</m:t>
                                       </m:r>
                                       <m:sSub>
                                         <m:sSubPr>
@@ -19005,7 +19611,7 @@
             </p:txBody>
           </p:sp>
         </mc:Choice>
-        <mc:Fallback>
+        <mc:Fallback xmlns="">
           <p:sp>
             <p:nvSpPr>
               <p:cNvPr id="15" name="CasellaDiTesto 14">
@@ -21145,7 +21751,7 @@
                 <a:latin typeface="Century Gothic"/>
                 <a:cs typeface="Century Gothic"/>
               </a:rPr>
-              <a:t>/32</a:t>
+              <a:t>/28</a:t>
             </a:r>
           </a:p>
         </p:txBody>
@@ -21985,7 +22591,7 @@
                 <a:latin typeface="Century Gothic"/>
                 <a:cs typeface="Century Gothic"/>
               </a:rPr>
-              <a:t>/32</a:t>
+              <a:t>/28</a:t>
             </a:r>
           </a:p>
         </p:txBody>
@@ -25866,7 +26472,7 @@
                 <a:latin typeface="Century Gothic"/>
                 <a:cs typeface="Century Gothic"/>
               </a:rPr>
-              <a:t>/32</a:t>
+              <a:t>/28</a:t>
             </a:r>
           </a:p>
         </p:txBody>
@@ -26326,7 +26932,7 @@
                 <a:latin typeface="Century Gothic"/>
                 <a:cs typeface="Century Gothic"/>
               </a:rPr>
-              <a:t>/32</a:t>
+              <a:t>/28</a:t>
             </a:r>
           </a:p>
         </p:txBody>
@@ -27665,7 +28271,7 @@
                 <a:latin typeface="Century Gothic"/>
                 <a:cs typeface="Century Gothic"/>
               </a:rPr>
-              <a:t>/32</a:t>
+              <a:t>/28</a:t>
             </a:r>
           </a:p>
         </p:txBody>
@@ -31191,7 +31797,7 @@
                 <a:latin typeface="Century Gothic"/>
                 <a:cs typeface="Century Gothic"/>
               </a:rPr>
-              <a:t>/32</a:t>
+              <a:t>/28</a:t>
             </a:r>
           </a:p>
         </p:txBody>
@@ -31348,9 +31954,9 @@
           </p:cNvPicPr>
           <p:nvPr/>
         </p:nvPicPr>
-        <p:blipFill rotWithShape="1">
+        <p:blipFill>
           <a:blip r:embed="rId4"/>
-          <a:srcRect l="14192" t="10884" r="1587" b="20123"/>
+          <a:srcRect t="4287" b="4287"/>
           <a:stretch/>
         </p:blipFill>
         <p:spPr>
@@ -31379,14 +31985,13 @@
         </p:nvPicPr>
         <p:blipFill>
           <a:blip r:embed="rId5"/>
-          <a:stretch>
-            <a:fillRect/>
-          </a:stretch>
+          <a:srcRect/>
+          <a:stretch/>
         </p:blipFill>
         <p:spPr>
           <a:xfrm>
-            <a:off x="535700" y="1976108"/>
-            <a:ext cx="2929933" cy="1764160"/>
+            <a:off x="538832" y="1976108"/>
+            <a:ext cx="2923668" cy="1764160"/>
           </a:xfrm>
           <a:prstGeom prst="rect">
             <a:avLst/>
@@ -31409,14 +32014,13 @@
         </p:nvPicPr>
         <p:blipFill>
           <a:blip r:embed="rId6"/>
-          <a:stretch>
-            <a:fillRect/>
-          </a:stretch>
+          <a:srcRect/>
+          <a:stretch/>
         </p:blipFill>
         <p:spPr>
           <a:xfrm>
-            <a:off x="3862783" y="2259566"/>
-            <a:ext cx="3301545" cy="2701264"/>
+            <a:off x="3862783" y="2265044"/>
+            <a:ext cx="3301545" cy="2690307"/>
           </a:xfrm>
           <a:prstGeom prst="rect">
             <a:avLst/>
@@ -31439,14 +32043,13 @@
         </p:nvPicPr>
         <p:blipFill>
           <a:blip r:embed="rId7"/>
-          <a:stretch>
-            <a:fillRect/>
-          </a:stretch>
+          <a:srcRect/>
+          <a:stretch/>
         </p:blipFill>
         <p:spPr>
           <a:xfrm>
-            <a:off x="7588522" y="1984490"/>
-            <a:ext cx="4215523" cy="1764161"/>
+            <a:off x="7600284" y="1984490"/>
+            <a:ext cx="4191998" cy="1764161"/>
           </a:xfrm>
           <a:prstGeom prst="rect">
             <a:avLst/>
@@ -31469,14 +32072,13 @@
         </p:nvPicPr>
         <p:blipFill>
           <a:blip r:embed="rId8"/>
-          <a:stretch>
-            <a:fillRect/>
-          </a:stretch>
+          <a:srcRect/>
+          <a:stretch/>
         </p:blipFill>
         <p:spPr>
           <a:xfrm>
-            <a:off x="7647956" y="4241365"/>
-            <a:ext cx="4256023" cy="1781008"/>
+            <a:off x="7659952" y="4241365"/>
+            <a:ext cx="4232030" cy="1781008"/>
           </a:xfrm>
           <a:prstGeom prst="rect">
             <a:avLst/>
@@ -31830,7 +32432,7 @@
                 <a:latin typeface="Century Gothic"/>
                 <a:cs typeface="Century Gothic"/>
               </a:rPr>
-              <a:t>/32</a:t>
+              <a:t>/28</a:t>
             </a:r>
           </a:p>
         </p:txBody>
@@ -31994,8 +32596,8 @@
         </p:blipFill>
         <p:spPr>
           <a:xfrm>
-            <a:off x="8728455" y="2246537"/>
-            <a:ext cx="3291458" cy="1439343"/>
+            <a:off x="8731110" y="2246537"/>
+            <a:ext cx="3286147" cy="1439343"/>
           </a:xfrm>
           <a:prstGeom prst="rect">
             <a:avLst/>
@@ -32120,8 +32722,8 @@
         </p:blipFill>
         <p:spPr>
           <a:xfrm>
-            <a:off x="8781811" y="4082092"/>
-            <a:ext cx="3269515" cy="1460338"/>
+            <a:off x="8788453" y="4082092"/>
+            <a:ext cx="3256231" cy="1460338"/>
           </a:xfrm>
           <a:prstGeom prst="rect">
             <a:avLst/>
@@ -32246,8 +32848,8 @@
         </p:blipFill>
         <p:spPr>
           <a:xfrm>
-            <a:off x="5354869" y="2226301"/>
-            <a:ext cx="3169981" cy="1439343"/>
+            <a:off x="5354869" y="2227443"/>
+            <a:ext cx="3169981" cy="1437058"/>
           </a:xfrm>
           <a:prstGeom prst="rect">
             <a:avLst/>
@@ -32372,8 +32974,8 @@
         </p:blipFill>
         <p:spPr>
           <a:xfrm>
-            <a:off x="5360890" y="4075331"/>
-            <a:ext cx="3269515" cy="1469878"/>
+            <a:off x="5360890" y="4077122"/>
+            <a:ext cx="3269515" cy="1466295"/>
           </a:xfrm>
           <a:prstGeom prst="rect">
             <a:avLst/>
@@ -32493,14 +33095,13 @@
         </p:nvPicPr>
         <p:blipFill>
           <a:blip r:embed="rId12"/>
-          <a:stretch>
-            <a:fillRect/>
-          </a:stretch>
+          <a:srcRect/>
+          <a:stretch/>
         </p:blipFill>
         <p:spPr>
           <a:xfrm>
-            <a:off x="192061" y="2103281"/>
-            <a:ext cx="4852862" cy="3672906"/>
+            <a:off x="212771" y="2103281"/>
+            <a:ext cx="4811442" cy="3672906"/>
           </a:xfrm>
           <a:prstGeom prst="rect">
             <a:avLst/>
@@ -32664,7 +33265,7 @@
                 <a:latin typeface="Century Gothic"/>
                 <a:cs typeface="Century Gothic"/>
               </a:rPr>
-              <a:t>/32</a:t>
+              <a:t>/28</a:t>
             </a:r>
           </a:p>
         </p:txBody>
@@ -32861,14 +33462,13 @@
         </p:nvPicPr>
         <p:blipFill>
           <a:blip r:embed="rId4"/>
-          <a:stretch>
-            <a:fillRect/>
-          </a:stretch>
+          <a:srcRect/>
+          <a:stretch/>
         </p:blipFill>
         <p:spPr>
           <a:xfrm>
-            <a:off x="639811" y="1930907"/>
-            <a:ext cx="4276961" cy="3566951"/>
+            <a:off x="639811" y="1962135"/>
+            <a:ext cx="4276961" cy="3504495"/>
           </a:xfrm>
           <a:prstGeom prst="rect">
             <a:avLst/>
@@ -32891,14 +33491,13 @@
         </p:nvPicPr>
         <p:blipFill>
           <a:blip r:embed="rId5"/>
-          <a:stretch>
-            <a:fillRect/>
-          </a:stretch>
+          <a:srcRect/>
+          <a:stretch/>
         </p:blipFill>
         <p:spPr>
           <a:xfrm>
-            <a:off x="5991297" y="2238920"/>
-            <a:ext cx="5394231" cy="3089837"/>
+            <a:off x="5991297" y="2239469"/>
+            <a:ext cx="5394231" cy="3088739"/>
           </a:xfrm>
           <a:prstGeom prst="rect">
             <a:avLst/>
@@ -33100,7 +33699,7 @@
                 <a:latin typeface="Century Gothic"/>
                 <a:cs typeface="Century Gothic"/>
               </a:rPr>
-              <a:t>/32</a:t>
+              <a:t>/28</a:t>
             </a:r>
           </a:p>
         </p:txBody>
@@ -33259,7 +33858,7 @@
         </p:nvPicPr>
         <p:blipFill rotWithShape="1">
           <a:blip r:embed="rId4"/>
-          <a:srcRect l="13004" t="9042" b="13876"/>
+          <a:srcRect l="1138" r="1138"/>
           <a:stretch/>
         </p:blipFill>
         <p:spPr>
@@ -33404,8 +34003,8 @@
         </p:blipFill>
         <p:spPr>
           <a:xfrm>
-            <a:off x="7582550" y="1984490"/>
-            <a:ext cx="4197486" cy="1764161"/>
+            <a:off x="7585294" y="1984490"/>
+            <a:ext cx="4191998" cy="1764161"/>
           </a:xfrm>
           <a:prstGeom prst="rect">
             <a:avLst/>
@@ -33433,8 +34032,8 @@
         </p:blipFill>
         <p:spPr>
           <a:xfrm>
-            <a:off x="7632966" y="4241695"/>
-            <a:ext cx="4256023" cy="1780347"/>
+            <a:off x="7645748" y="4241695"/>
+            <a:ext cx="4230459" cy="1780347"/>
           </a:xfrm>
           <a:prstGeom prst="rect">
             <a:avLst/>
@@ -33674,7 +34273,7 @@
                 <a:latin typeface="Century Gothic"/>
                 <a:cs typeface="Century Gothic"/>
               </a:rPr>
-              <a:t>/32</a:t>
+              <a:t>/28</a:t>
             </a:r>
           </a:p>
         </p:txBody>
@@ -33838,8 +34437,8 @@
         </p:blipFill>
         <p:spPr>
           <a:xfrm>
-            <a:off x="8767331" y="2246537"/>
-            <a:ext cx="3213705" cy="1439343"/>
+            <a:off x="8769475" y="2246537"/>
+            <a:ext cx="3209417" cy="1439343"/>
           </a:xfrm>
           <a:prstGeom prst="rect">
             <a:avLst/>
@@ -34090,8 +34689,8 @@
         </p:blipFill>
         <p:spPr>
           <a:xfrm>
-            <a:off x="5354869" y="2233323"/>
-            <a:ext cx="3169981" cy="1425299"/>
+            <a:off x="5354869" y="2251742"/>
+            <a:ext cx="3169981" cy="1388461"/>
           </a:xfrm>
           <a:prstGeom prst="rect">
             <a:avLst/>
@@ -34216,8 +34815,8 @@
         </p:blipFill>
         <p:spPr>
           <a:xfrm>
-            <a:off x="5360890" y="4094653"/>
-            <a:ext cx="3269515" cy="1431233"/>
+            <a:off x="5374987" y="4094653"/>
+            <a:ext cx="3241321" cy="1431233"/>
           </a:xfrm>
           <a:prstGeom prst="rect">
             <a:avLst/>
@@ -34342,8 +34941,8 @@
         </p:blipFill>
         <p:spPr>
           <a:xfrm>
-            <a:off x="212314" y="2103281"/>
-            <a:ext cx="4812356" cy="3672906"/>
+            <a:off x="221168" y="2103281"/>
+            <a:ext cx="4794648" cy="3672906"/>
           </a:xfrm>
           <a:prstGeom prst="rect">
             <a:avLst/>
@@ -34507,7 +35106,7 @@
                 <a:latin typeface="Century Gothic"/>
                 <a:cs typeface="Century Gothic"/>
               </a:rPr>
-              <a:t>/32</a:t>
+              <a:t>/28</a:t>
             </a:r>
           </a:p>
         </p:txBody>
@@ -34709,8 +35308,8 @@
         </p:blipFill>
         <p:spPr>
           <a:xfrm>
-            <a:off x="639811" y="1960060"/>
-            <a:ext cx="4276961" cy="3508645"/>
+            <a:off x="639811" y="1986176"/>
+            <a:ext cx="4276961" cy="3456413"/>
           </a:xfrm>
           <a:prstGeom prst="rect">
             <a:avLst/>
@@ -34738,8 +35337,8 @@
         </p:blipFill>
         <p:spPr>
           <a:xfrm>
-            <a:off x="5991297" y="2259729"/>
-            <a:ext cx="5394231" cy="3048219"/>
+            <a:off x="5991297" y="2263725"/>
+            <a:ext cx="5394231" cy="3040226"/>
           </a:xfrm>
           <a:prstGeom prst="rect">
             <a:avLst/>
@@ -34934,15 +35533,22 @@
               <a:t>28</a:t>
             </a:fld>
             <a:r>
-              <a:rPr lang="it-IT" sz="1400" dirty="0">
+              <a:rPr lang="it-IT" sz="1400">
                 <a:solidFill>
                   <a:srgbClr val="162230"/>
                 </a:solidFill>
                 <a:latin typeface="Century Gothic"/>
                 <a:cs typeface="Century Gothic"/>
               </a:rPr>
-              <a:t>/32</a:t>
-            </a:r>
+              <a:t>/28</a:t>
+            </a:r>
+            <a:endParaRPr lang="it-IT" sz="1400" dirty="0">
+              <a:solidFill>
+                <a:srgbClr val="162230"/>
+              </a:solidFill>
+              <a:latin typeface="Century Gothic"/>
+              <a:cs typeface="Century Gothic"/>
+            </a:endParaRPr>
           </a:p>
         </p:txBody>
       </p:sp>
@@ -35204,7 +35810,7 @@
                 <a:latin typeface="Century Gothic"/>
                 <a:cs typeface="Century Gothic"/>
               </a:rPr>
-              <a:t>/32</a:t>
+              <a:t>/28</a:t>
             </a:r>
           </a:p>
         </p:txBody>
@@ -38209,7 +38815,7 @@
                 <a:latin typeface="Century Gothic"/>
                 <a:cs typeface="Century Gothic"/>
               </a:rPr>
-              <a:t>/32</a:t>
+              <a:t>/28</a:t>
             </a:r>
           </a:p>
         </p:txBody>
@@ -39018,7 +39624,7 @@
                 <a:latin typeface="Century Gothic"/>
                 <a:cs typeface="Century Gothic"/>
               </a:rPr>
-              <a:t>/32</a:t>
+              <a:t>/28</a:t>
             </a:r>
           </a:p>
         </p:txBody>
@@ -39165,8 +39771,8 @@
         </p:nvSpPr>
         <p:spPr>
           <a:xfrm>
-            <a:off x="111616" y="2046018"/>
-            <a:ext cx="6798547" cy="400110"/>
+            <a:off x="111616" y="1747447"/>
+            <a:ext cx="6715758" cy="400110"/>
           </a:xfrm>
           <a:prstGeom prst="rect">
             <a:avLst/>
@@ -39213,7 +39819,7 @@
               <a:rPr lang="it-IT" sz="2000" dirty="0">
                 <a:latin typeface="Century Gothic" panose="020B0502020202020204" pitchFamily="34" charset="0"/>
               </a:rPr>
-              <a:t> with MATLAB</a:t>
+              <a:t> from image with MATLAB </a:t>
             </a:r>
           </a:p>
         </p:txBody>
@@ -39240,7 +39846,7 @@
         </p:blipFill>
         <p:spPr>
           <a:xfrm>
-            <a:off x="647372" y="3106586"/>
+            <a:off x="647372" y="3041271"/>
             <a:ext cx="4416166" cy="2603357"/>
           </a:xfrm>
           <a:prstGeom prst="rect">
@@ -39262,7 +39868,7 @@
         </p:nvSpPr>
         <p:spPr>
           <a:xfrm>
-            <a:off x="5340817" y="4367630"/>
+            <a:off x="5340817" y="4302315"/>
             <a:ext cx="1143000" cy="195942"/>
           </a:xfrm>
           <a:prstGeom prst="rightArrow">
@@ -39335,7 +39941,7 @@
         </p:blipFill>
         <p:spPr>
           <a:xfrm>
-            <a:off x="6761096" y="3047317"/>
+            <a:off x="6761096" y="2982002"/>
             <a:ext cx="4552663" cy="2697874"/>
           </a:xfrm>
           <a:prstGeom prst="rect">
@@ -39343,323 +39949,6 @@
           </a:prstGeom>
         </p:spPr>
       </p:pic>
-      <p:sp>
-        <p:nvSpPr>
-          <p:cNvPr id="7" name="CasellaDiTesto 6">
-            <a:extLst>
-              <a:ext uri="{FF2B5EF4-FFF2-40B4-BE49-F238E27FC236}">
-                <a16:creationId xmlns:a16="http://schemas.microsoft.com/office/drawing/2014/main" id="{64E0314A-6182-DBAB-6AB5-B32253E3F7D6}"/>
-              </a:ext>
-            </a:extLst>
-          </p:cNvPr>
-          <p:cNvSpPr txBox="1"/>
-          <p:nvPr/>
-        </p:nvSpPr>
-        <p:spPr>
-          <a:xfrm>
-            <a:off x="6483817" y="1922907"/>
-            <a:ext cx="6131378" cy="646331"/>
-          </a:xfrm>
-          <a:prstGeom prst="rect">
-            <a:avLst/>
-          </a:prstGeom>
-          <a:noFill/>
-        </p:spPr>
-        <p:txBody>
-          <a:bodyPr wrap="square">
-            <a:spAutoFit/>
-          </a:bodyPr>
-          <a:lstStyle/>
-          <a:p>
-            <a:pPr algn="l"/>
-            <a:r>
-              <a:rPr lang="en-US" sz="1800" b="0" i="0" u="none" strike="noStrike" baseline="0" dirty="0">
-                <a:latin typeface="CMR12"/>
-              </a:rPr>
-              <a:t>matrix composed of 0 and 1 in which the 0 express</a:t>
-            </a:r>
-          </a:p>
-          <a:p>
-            <a:pPr algn="l"/>
-            <a:r>
-              <a:rPr lang="en-US" sz="1800" b="0" i="0" u="none" strike="noStrike" baseline="0" dirty="0">
-                <a:latin typeface="CMR12"/>
-              </a:rPr>
-              <a:t>obstacles while 1 the space to be walked.</a:t>
-            </a:r>
-            <a:endParaRPr lang="it-IT" dirty="0"/>
-          </a:p>
-        </p:txBody>
-      </p:sp>
-      <p:pic>
-        <p:nvPicPr>
-          <p:cNvPr id="10" name="Immagine 9">
-            <a:extLst>
-              <a:ext uri="{FF2B5EF4-FFF2-40B4-BE49-F238E27FC236}">
-                <a16:creationId xmlns:a16="http://schemas.microsoft.com/office/drawing/2014/main" id="{FF1C2BD6-F79C-334B-DC4C-6AED5D112C63}"/>
-              </a:ext>
-            </a:extLst>
-          </p:cNvPr>
-          <p:cNvPicPr>
-            <a:picLocks noChangeAspect="1"/>
-          </p:cNvPicPr>
-          <p:nvPr/>
-        </p:nvPicPr>
-        <p:blipFill>
-          <a:blip r:embed="rId6"/>
-          <a:srcRect/>
-          <a:stretch/>
-        </p:blipFill>
-        <p:spPr>
-          <a:xfrm>
-            <a:off x="3510889" y="1653286"/>
-            <a:ext cx="7290909" cy="3290378"/>
-          </a:xfrm>
-          <a:prstGeom prst="rect">
-            <a:avLst/>
-          </a:prstGeom>
-        </p:spPr>
-      </p:pic>
-      <p:sp>
-        <p:nvSpPr>
-          <p:cNvPr id="12" name="CasellaDiTesto 11">
-            <a:extLst>
-              <a:ext uri="{FF2B5EF4-FFF2-40B4-BE49-F238E27FC236}">
-                <a16:creationId xmlns:a16="http://schemas.microsoft.com/office/drawing/2014/main" id="{DEF0F36E-C355-2EDE-C13E-9D3D04AC1418}"/>
-              </a:ext>
-            </a:extLst>
-          </p:cNvPr>
-          <p:cNvSpPr txBox="1"/>
-          <p:nvPr/>
-        </p:nvSpPr>
-        <p:spPr>
-          <a:xfrm>
-            <a:off x="634584" y="4042040"/>
-            <a:ext cx="8789969" cy="2308324"/>
-          </a:xfrm>
-          <a:prstGeom prst="rect">
-            <a:avLst/>
-          </a:prstGeom>
-          <a:noFill/>
-        </p:spPr>
-        <p:txBody>
-          <a:bodyPr wrap="square">
-            <a:spAutoFit/>
-          </a:bodyPr>
-          <a:lstStyle/>
-          <a:p>
-            <a:pPr algn="l"/>
-            <a:r>
-              <a:rPr lang="en-US" sz="1800" b="0" i="0" u="none" strike="noStrike" baseline="0" dirty="0">
-                <a:latin typeface="CMR12"/>
-              </a:rPr>
-              <a:t>Then at the end the path that is obtained is given</a:t>
-            </a:r>
-          </a:p>
-          <a:p>
-            <a:pPr algn="l"/>
-            <a:r>
-              <a:rPr lang="en-US" sz="1800" b="0" i="0" u="none" strike="noStrike" baseline="0" dirty="0">
-                <a:latin typeface="CMR12"/>
-              </a:rPr>
-              <a:t>by the nodes that are expressed as cells of this matrix whose coordinates are constituted</a:t>
-            </a:r>
-          </a:p>
-          <a:p>
-            <a:pPr algn="l"/>
-            <a:r>
-              <a:rPr lang="en-US" sz="1800" b="0" i="0" u="none" strike="noStrike" baseline="0" dirty="0">
-                <a:latin typeface="CMR12"/>
-              </a:rPr>
-              <a:t>by the row and the column. Consequently giving these coordinates in </a:t>
-            </a:r>
-            <a:r>
-              <a:rPr lang="en-US" sz="1800" b="0" i="0" u="none" strike="noStrike" baseline="0" dirty="0" err="1">
-                <a:latin typeface="CMR12"/>
-              </a:rPr>
-              <a:t>simulink</a:t>
-            </a:r>
-            <a:r>
-              <a:rPr lang="en-US" sz="1800" b="0" i="0" u="none" strike="noStrike" baseline="0" dirty="0">
-                <a:latin typeface="CMR12"/>
-              </a:rPr>
-              <a:t> the path</a:t>
-            </a:r>
-          </a:p>
-          <a:p>
-            <a:pPr algn="l"/>
-            <a:r>
-              <a:rPr lang="en-US" sz="1800" b="0" i="0" u="none" strike="noStrike" baseline="0" dirty="0">
-                <a:latin typeface="CMR12"/>
-              </a:rPr>
-              <a:t>is obtained with y inverse, then to obtain the reference trajectory the y coordinate has</a:t>
-            </a:r>
-          </a:p>
-          <a:p>
-            <a:pPr algn="l"/>
-            <a:r>
-              <a:rPr lang="en-US" sz="1800" b="0" i="0" u="none" strike="noStrike" baseline="0" dirty="0">
-                <a:latin typeface="CMR12"/>
-              </a:rPr>
-              <a:t>been scaled, by applying the following formula:</a:t>
-            </a:r>
-          </a:p>
-          <a:p>
-            <a:pPr algn="l"/>
-            <a:r>
-              <a:rPr lang="en-US" sz="1800" b="0" i="0" u="none" strike="noStrike" baseline="0" dirty="0" err="1">
-                <a:latin typeface="CMMI12"/>
-              </a:rPr>
-              <a:t>y</a:t>
-            </a:r>
-            <a:r>
-              <a:rPr lang="en-US" sz="1050" b="0" i="0" u="none" strike="noStrike" baseline="0" dirty="0" err="1">
-                <a:latin typeface="CMMI8"/>
-              </a:rPr>
-              <a:t>ref</a:t>
-            </a:r>
-            <a:r>
-              <a:rPr lang="en-US" sz="1050" b="0" i="0" u="none" strike="noStrike" baseline="0" dirty="0">
-                <a:latin typeface="CMMI8"/>
-              </a:rPr>
-              <a:t> </a:t>
-            </a:r>
-            <a:r>
-              <a:rPr lang="en-US" sz="1800" b="0" i="0" u="none" strike="noStrike" baseline="0" dirty="0">
-                <a:latin typeface="CMR12"/>
-              </a:rPr>
-              <a:t>= </a:t>
-            </a:r>
-            <a:r>
-              <a:rPr lang="en-US" sz="1800" b="0" i="0" u="none" strike="noStrike" baseline="0" dirty="0">
-                <a:latin typeface="CMMI12"/>
-              </a:rPr>
-              <a:t>size</a:t>
-            </a:r>
-            <a:r>
-              <a:rPr lang="en-US" sz="1800" b="0" i="0" u="none" strike="noStrike" baseline="0" dirty="0">
-                <a:latin typeface="CMR12"/>
-              </a:rPr>
-              <a:t>(</a:t>
-            </a:r>
-            <a:r>
-              <a:rPr lang="en-US" sz="1800" b="0" i="0" u="none" strike="noStrike" baseline="0" dirty="0">
-                <a:latin typeface="CMMI12"/>
-              </a:rPr>
-              <a:t>map, </a:t>
-            </a:r>
-            <a:r>
-              <a:rPr lang="en-US" sz="1800" b="0" i="0" u="none" strike="noStrike" baseline="0" dirty="0">
-                <a:latin typeface="CMR12"/>
-              </a:rPr>
-              <a:t>1) </a:t>
-            </a:r>
-            <a:r>
-              <a:rPr lang="en-US" sz="1800" b="0" i="0" u="none" strike="noStrike" baseline="0" dirty="0">
-                <a:latin typeface="CMSY10"/>
-              </a:rPr>
-              <a:t>− </a:t>
-            </a:r>
-            <a:r>
-              <a:rPr lang="en-US" sz="1800" b="0" i="0" u="none" strike="noStrike" baseline="0" dirty="0">
-                <a:latin typeface="CMMI12"/>
-              </a:rPr>
-              <a:t>y</a:t>
-            </a:r>
-          </a:p>
-          <a:p>
-            <a:pPr algn="l"/>
-            <a:r>
-              <a:rPr lang="en-US" sz="1800" b="0" i="0" u="none" strike="noStrike" baseline="0" dirty="0">
-                <a:latin typeface="CMR12"/>
-              </a:rPr>
-              <a:t>in which </a:t>
-            </a:r>
-            <a:r>
-              <a:rPr lang="en-US" sz="1800" b="0" i="0" u="none" strike="noStrike" baseline="0" dirty="0">
-                <a:latin typeface="CMMI12"/>
-              </a:rPr>
-              <a:t>size</a:t>
-            </a:r>
-            <a:r>
-              <a:rPr lang="en-US" sz="1800" b="0" i="0" u="none" strike="noStrike" baseline="0" dirty="0">
-                <a:latin typeface="CMR12"/>
-              </a:rPr>
-              <a:t>(</a:t>
-            </a:r>
-            <a:r>
-              <a:rPr lang="en-US" sz="1800" b="0" i="0" u="none" strike="noStrike" baseline="0" dirty="0">
-                <a:latin typeface="CMMI12"/>
-              </a:rPr>
-              <a:t>map, </a:t>
-            </a:r>
-            <a:r>
-              <a:rPr lang="en-US" sz="1800" b="0" i="0" u="none" strike="noStrike" baseline="0" dirty="0">
-                <a:latin typeface="CMR12"/>
-              </a:rPr>
-              <a:t>1) expresses the number of rows of the map, while the </a:t>
-            </a:r>
-            <a:r>
-              <a:rPr lang="en-US" sz="1800" b="0" i="0" u="none" strike="noStrike" baseline="0" dirty="0">
-                <a:latin typeface="CMMI12"/>
-              </a:rPr>
-              <a:t>y </a:t>
-            </a:r>
-            <a:r>
-              <a:rPr lang="en-US" sz="1800" b="0" i="0" u="none" strike="noStrike" baseline="0" dirty="0">
-                <a:latin typeface="CMR12"/>
-              </a:rPr>
-              <a:t>the row where</a:t>
-            </a:r>
-          </a:p>
-          <a:p>
-            <a:pPr algn="l"/>
-            <a:r>
-              <a:rPr lang="it-IT" sz="1800" b="0" i="0" u="none" strike="noStrike" baseline="0" dirty="0">
-                <a:latin typeface="CMR12"/>
-              </a:rPr>
-              <a:t>the </a:t>
-            </a:r>
-            <a:r>
-              <a:rPr lang="it-IT" sz="1800" b="0" i="0" u="none" strike="noStrike" baseline="0" dirty="0" err="1">
-                <a:latin typeface="CMR12"/>
-              </a:rPr>
-              <a:t>node</a:t>
-            </a:r>
-            <a:r>
-              <a:rPr lang="it-IT" sz="1800" b="0" i="0" u="none" strike="noStrike" baseline="0" dirty="0">
-                <a:latin typeface="CMR12"/>
-              </a:rPr>
-              <a:t> </a:t>
-            </a:r>
-            <a:r>
-              <a:rPr lang="it-IT" sz="1800" b="0" i="0" u="none" strike="noStrike" baseline="0" dirty="0" err="1">
-                <a:latin typeface="CMR12"/>
-              </a:rPr>
-              <a:t>is</a:t>
-            </a:r>
-            <a:r>
-              <a:rPr lang="it-IT" sz="1800" b="0" i="0" u="none" strike="noStrike" baseline="0" dirty="0">
-                <a:latin typeface="CMR12"/>
-              </a:rPr>
-              <a:t> </a:t>
-            </a:r>
-            <a:r>
-              <a:rPr lang="it-IT" sz="1800" b="0" i="0" u="none" strike="noStrike" baseline="0" dirty="0" err="1">
-                <a:latin typeface="CMR12"/>
-              </a:rPr>
-              <a:t>located</a:t>
-            </a:r>
-            <a:r>
-              <a:rPr lang="it-IT" sz="1800" b="0" i="0" u="none" strike="noStrike" baseline="0" dirty="0">
-                <a:latin typeface="CMR12"/>
-              </a:rPr>
-              <a:t>.</a:t>
-            </a:r>
-            <a:endParaRPr lang="it-IT" dirty="0"/>
-          </a:p>
-        </p:txBody>
-      </p:sp>
       <mc:AlternateContent xmlns:mc="http://schemas.openxmlformats.org/markup-compatibility/2006" xmlns:a14="http://schemas.microsoft.com/office/drawing/2010/main">
         <mc:Choice Requires="a14">
           <p:sp>
@@ -39676,7 +39965,7 @@
             </p:nvSpPr>
             <p:spPr>
               <a:xfrm>
-                <a:off x="6827374" y="1172985"/>
+                <a:off x="4655967" y="5869060"/>
                 <a:ext cx="2784423" cy="391582"/>
               </a:xfrm>
               <a:prstGeom prst="rect">
@@ -39794,16 +40083,16 @@
             </p:nvSpPr>
             <p:spPr>
               <a:xfrm>
-                <a:off x="6827374" y="1172985"/>
+                <a:off x="4655967" y="5869060"/>
                 <a:ext cx="2784423" cy="391582"/>
               </a:xfrm>
               <a:prstGeom prst="rect">
                 <a:avLst/>
               </a:prstGeom>
               <a:blipFill>
-                <a:blip r:embed="rId7"/>
+                <a:blip r:embed="rId6"/>
                 <a:stretch>
-                  <a:fillRect b="-9231"/>
+                  <a:fillRect b="-9375"/>
                 </a:stretch>
               </a:blipFill>
             </p:spPr>
@@ -39822,6 +40111,112 @@
           </p:sp>
         </mc:Fallback>
       </mc:AlternateContent>
+      <p:sp>
+        <p:nvSpPr>
+          <p:cNvPr id="11" name="CasellaDiTesto 10">
+            <a:extLst>
+              <a:ext uri="{FF2B5EF4-FFF2-40B4-BE49-F238E27FC236}">
+                <a16:creationId xmlns:a16="http://schemas.microsoft.com/office/drawing/2014/main" id="{8A96CE69-CBAA-A472-F71D-3AE159A568E6}"/>
+              </a:ext>
+            </a:extLst>
+          </p:cNvPr>
+          <p:cNvSpPr txBox="1"/>
+          <p:nvPr/>
+        </p:nvSpPr>
+        <p:spPr>
+          <a:xfrm>
+            <a:off x="328604" y="2193296"/>
+            <a:ext cx="6498770" cy="707886"/>
+          </a:xfrm>
+          <a:prstGeom prst="rect">
+            <a:avLst/>
+          </a:prstGeom>
+          <a:noFill/>
+        </p:spPr>
+        <p:txBody>
+          <a:bodyPr wrap="square">
+            <a:spAutoFit/>
+          </a:bodyPr>
+          <a:lstStyle/>
+          <a:p>
+            <a:pPr algn="l"/>
+            <a:r>
+              <a:rPr lang="en-US" sz="2000" b="1" dirty="0">
+                <a:latin typeface="Century Gothic" panose="020B0502020202020204" pitchFamily="34" charset="0"/>
+              </a:rPr>
+              <a:t>0</a:t>
+            </a:r>
+            <a:r>
+              <a:rPr lang="en-US" sz="2000" dirty="0">
+                <a:latin typeface="Century Gothic" panose="020B0502020202020204" pitchFamily="34" charset="0"/>
+              </a:rPr>
+              <a:t> </a:t>
+            </a:r>
+            <a:r>
+              <a:rPr lang="en-US" sz="2000" dirty="0">
+                <a:latin typeface="Century Gothic" panose="020B0502020202020204" pitchFamily="34" charset="0"/>
+                <a:sym typeface="Wingdings" panose="05000000000000000000" pitchFamily="2" charset="2"/>
+              </a:rPr>
+              <a:t></a:t>
+            </a:r>
+            <a:r>
+              <a:rPr lang="en-US" sz="2000" dirty="0">
+                <a:latin typeface="Century Gothic" panose="020B0502020202020204" pitchFamily="34" charset="0"/>
+              </a:rPr>
+              <a:t> cell with an </a:t>
+            </a:r>
+            <a:r>
+              <a:rPr lang="en-US" sz="2000" b="1" dirty="0">
+                <a:latin typeface="Century Gothic" panose="020B0502020202020204" pitchFamily="34" charset="0"/>
+              </a:rPr>
+              <a:t>obstacle</a:t>
+            </a:r>
+          </a:p>
+          <a:p>
+            <a:pPr algn="l"/>
+            <a:r>
+              <a:rPr lang="en-US" sz="2000" b="1" dirty="0">
+                <a:latin typeface="Century Gothic" panose="020B0502020202020204" pitchFamily="34" charset="0"/>
+              </a:rPr>
+              <a:t>1</a:t>
+            </a:r>
+            <a:r>
+              <a:rPr lang="en-US" sz="2000" dirty="0">
+                <a:latin typeface="Century Gothic" panose="020B0502020202020204" pitchFamily="34" charset="0"/>
+              </a:rPr>
+              <a:t> </a:t>
+            </a:r>
+            <a:r>
+              <a:rPr lang="en-US" sz="2000" dirty="0">
+                <a:latin typeface="Century Gothic" panose="020B0502020202020204" pitchFamily="34" charset="0"/>
+                <a:sym typeface="Wingdings" panose="05000000000000000000" pitchFamily="2" charset="2"/>
+              </a:rPr>
+              <a:t></a:t>
+            </a:r>
+            <a:r>
+              <a:rPr lang="en-US" sz="2000" dirty="0">
+                <a:latin typeface="Century Gothic" panose="020B0502020202020204" pitchFamily="34" charset="0"/>
+              </a:rPr>
+              <a:t> </a:t>
+            </a:r>
+            <a:r>
+              <a:rPr lang="en-US" sz="2000" b="1" dirty="0">
+                <a:latin typeface="Century Gothic" panose="020B0502020202020204" pitchFamily="34" charset="0"/>
+              </a:rPr>
+              <a:t>free</a:t>
+            </a:r>
+            <a:r>
+              <a:rPr lang="en-US" sz="2000" dirty="0">
+                <a:latin typeface="Century Gothic" panose="020B0502020202020204" pitchFamily="34" charset="0"/>
+              </a:rPr>
+              <a:t> cell</a:t>
+            </a:r>
+            <a:endParaRPr lang="it-IT" sz="2000" dirty="0">
+              <a:latin typeface="Century Gothic" panose="020B0502020202020204" pitchFamily="34" charset="0"/>
+            </a:endParaRPr>
+          </a:p>
+        </p:txBody>
+      </p:sp>
     </p:spTree>
     <p:extLst>
       <p:ext uri="{BB962C8B-B14F-4D97-AF65-F5344CB8AC3E}">
@@ -39988,7 +40383,7 @@
                 <a:latin typeface="Century Gothic"/>
                 <a:cs typeface="Century Gothic"/>
               </a:rPr>
-              <a:t>/32</a:t>
+              <a:t>/28</a:t>
             </a:r>
           </a:p>
         </p:txBody>
@@ -41214,7 +41609,7 @@
                 <a:latin typeface="Century Gothic"/>
                 <a:cs typeface="Century Gothic"/>
               </a:rPr>
-              <a:t>/32</a:t>
+              <a:t>/28</a:t>
             </a:r>
           </a:p>
         </p:txBody>
@@ -42282,7 +42677,7 @@
                 <a:latin typeface="Century Gothic"/>
                 <a:cs typeface="Century Gothic"/>
               </a:rPr>
-              <a:t>/32</a:t>
+              <a:t>/28</a:t>
             </a:r>
           </a:p>
         </p:txBody>
@@ -43143,7 +43538,7 @@
                 <a:latin typeface="Century Gothic"/>
                 <a:cs typeface="Century Gothic"/>
               </a:rPr>
-              <a:t>/32</a:t>
+              <a:t>/28</a:t>
             </a:r>
           </a:p>
         </p:txBody>
@@ -43263,7 +43658,7 @@
         </p:nvSpPr>
         <p:spPr>
           <a:xfrm>
-            <a:off x="546054" y="5935844"/>
+            <a:off x="531064" y="5935844"/>
             <a:ext cx="6410095" cy="369332"/>
           </a:xfrm>
           <a:prstGeom prst="rect">
@@ -43314,7 +43709,7 @@
         </p:nvSpPr>
         <p:spPr>
           <a:xfrm>
-            <a:off x="1096818" y="1963619"/>
+            <a:off x="1081828" y="1963619"/>
             <a:ext cx="2474844" cy="884583"/>
           </a:xfrm>
           <a:prstGeom prst="rect">
@@ -43375,7 +43770,7 @@
         </p:nvSpPr>
         <p:spPr>
           <a:xfrm>
-            <a:off x="546054" y="2133309"/>
+            <a:off x="531064" y="2133309"/>
             <a:ext cx="453002" cy="427601"/>
           </a:xfrm>
           <a:prstGeom prst="ellipse">
@@ -43440,7 +43835,7 @@
         </p:nvSpPr>
         <p:spPr>
           <a:xfrm>
-            <a:off x="6398820" y="4309055"/>
+            <a:off x="6353850" y="4309055"/>
             <a:ext cx="2474844" cy="884583"/>
           </a:xfrm>
           <a:prstGeom prst="rect">
@@ -43507,7 +43902,7 @@
         </p:nvSpPr>
         <p:spPr>
           <a:xfrm>
-            <a:off x="5848056" y="4478745"/>
+            <a:off x="5803086" y="4478745"/>
             <a:ext cx="453002" cy="427601"/>
           </a:xfrm>
           <a:prstGeom prst="ellipse">
@@ -43572,7 +43967,7 @@
         </p:nvSpPr>
         <p:spPr>
           <a:xfrm>
-            <a:off x="3697475" y="3121491"/>
+            <a:off x="3682485" y="3121491"/>
             <a:ext cx="2474844" cy="884583"/>
           </a:xfrm>
           <a:prstGeom prst="rect">
@@ -43630,7 +44025,7 @@
         </p:nvSpPr>
         <p:spPr>
           <a:xfrm>
-            <a:off x="3146711" y="3291181"/>
+            <a:off x="3131721" y="3291181"/>
             <a:ext cx="453002" cy="427601"/>
           </a:xfrm>
           <a:prstGeom prst="ellipse">
@@ -43827,7 +44222,7 @@
         </p:nvSpPr>
         <p:spPr>
           <a:xfrm>
-            <a:off x="3273414" y="2017162"/>
+            <a:off x="3258424" y="2017162"/>
             <a:ext cx="4016265" cy="861774"/>
           </a:xfrm>
           <a:prstGeom prst="rect">

</xml_diff>